<commit_message>
Criado pasta de imagens e foram acrescentado mais coisas no slide
</commit_message>
<xml_diff>
--- a/GERENCIAMENTO DO TEMPO DO PROJETO.pptx
+++ b/GERENCIAMENTO DO TEMPO DO PROJETO.pptx
@@ -6,7 +6,7 @@
     <p:sldMasterId id="2147483778" r:id="rId2"/>
   </p:sldMasterIdLst>
   <p:notesMasterIdLst>
-    <p:notesMasterId r:id="rId12"/>
+    <p:notesMasterId r:id="rId17"/>
   </p:notesMasterIdLst>
   <p:sldIdLst>
     <p:sldId id="256" r:id="rId3"/>
@@ -15,9 +15,14 @@
     <p:sldId id="264" r:id="rId6"/>
     <p:sldId id="258" r:id="rId7"/>
     <p:sldId id="259" r:id="rId8"/>
-    <p:sldId id="261" r:id="rId9"/>
-    <p:sldId id="262" r:id="rId10"/>
-    <p:sldId id="263" r:id="rId11"/>
+    <p:sldId id="265" r:id="rId9"/>
+    <p:sldId id="266" r:id="rId10"/>
+    <p:sldId id="267" r:id="rId11"/>
+    <p:sldId id="268" r:id="rId12"/>
+    <p:sldId id="269" r:id="rId13"/>
+    <p:sldId id="261" r:id="rId14"/>
+    <p:sldId id="262" r:id="rId15"/>
+    <p:sldId id="263" r:id="rId16"/>
   </p:sldIdLst>
   <p:sldSz cx="12192000" cy="6858000"/>
   <p:notesSz cx="6858000" cy="9144000"/>
@@ -206,7 +211,7 @@
           <a:p>
             <a:fld id="{55A54046-86AD-4F73-B429-F4950E34E05D}" type="datetimeFigureOut">
               <a:rPr lang="pt-BR" smtClean="0"/>
-              <a:t>08/05/2016</a:t>
+              <a:t>14/05/2016</a:t>
             </a:fld>
             <a:endParaRPr lang="pt-BR"/>
           </a:p>
@@ -783,7 +788,7 @@
           <a:p>
             <a:fld id="{9080F730-6E62-4001-9560-BCF41BE9EC22}" type="datetime1">
               <a:rPr lang="pt-BR" smtClean="0"/>
-              <a:t>08/05/2016</a:t>
+              <a:t>14/05/2016</a:t>
             </a:fld>
             <a:endParaRPr lang="pt-BR"/>
           </a:p>
@@ -956,7 +961,7 @@
           <a:p>
             <a:fld id="{532E7A99-8EE6-4505-8E1F-20BB061D7BBF}" type="datetime1">
               <a:rPr lang="pt-BR" smtClean="0"/>
-              <a:t>08/05/2016</a:t>
+              <a:t>14/05/2016</a:t>
             </a:fld>
             <a:endParaRPr lang="pt-BR"/>
           </a:p>
@@ -1139,7 +1144,7 @@
           <a:p>
             <a:fld id="{C2475B68-2C13-4F97-8EBC-D4A5C921CDB4}" type="datetime1">
               <a:rPr lang="pt-BR" smtClean="0"/>
-              <a:t>08/05/2016</a:t>
+              <a:t>14/05/2016</a:t>
             </a:fld>
             <a:endParaRPr lang="pt-BR"/>
           </a:p>
@@ -1391,7 +1396,7 @@
           <a:p>
             <a:fld id="{05A86FA6-8616-48F3-B4AC-FCCA26ACACB4}" type="datetime1">
               <a:rPr lang="pt-BR" smtClean="0"/>
-              <a:t>08/05/2016</a:t>
+              <a:t>14/05/2016</a:t>
             </a:fld>
             <a:endParaRPr lang="pt-BR"/>
           </a:p>
@@ -1661,7 +1666,7 @@
           <a:p>
             <a:fld id="{B1316E27-950D-40B9-8A49-3463212A954D}" type="datetime1">
               <a:rPr lang="pt-BR" smtClean="0"/>
-              <a:t>08/05/2016</a:t>
+              <a:t>14/05/2016</a:t>
             </a:fld>
             <a:endParaRPr lang="pt-BR"/>
           </a:p>
@@ -1993,7 +1998,7 @@
           <a:p>
             <a:fld id="{7A65F5D2-A710-426F-A5C3-7E354EB1F3FC}" type="datetime1">
               <a:rPr lang="pt-BR" smtClean="0"/>
-              <a:t>08/05/2016</a:t>
+              <a:t>14/05/2016</a:t>
             </a:fld>
             <a:endParaRPr lang="pt-BR"/>
           </a:p>
@@ -2319,7 +2324,7 @@
           <a:p>
             <a:fld id="{1F939DD6-E2BE-4816-AD2B-EFB9313FCEA3}" type="datetime1">
               <a:rPr lang="pt-BR" smtClean="0"/>
-              <a:t>08/05/2016</a:t>
+              <a:t>14/05/2016</a:t>
             </a:fld>
             <a:endParaRPr lang="pt-BR"/>
           </a:p>
@@ -2779,7 +2784,7 @@
           <a:p>
             <a:fld id="{057CC2F5-493D-48A8-9C5F-515C16027E2E}" type="datetime1">
               <a:rPr lang="pt-BR" smtClean="0"/>
-              <a:t>08/05/2016</a:t>
+              <a:t>14/05/2016</a:t>
             </a:fld>
             <a:endParaRPr lang="pt-BR"/>
           </a:p>
@@ -2987,7 +2992,7 @@
           <a:p>
             <a:fld id="{95FC0577-C7F6-4B89-A6AD-A7405E30C6C0}" type="datetime1">
               <a:rPr lang="pt-BR" smtClean="0"/>
-              <a:t>08/05/2016</a:t>
+              <a:t>14/05/2016</a:t>
             </a:fld>
             <a:endParaRPr lang="pt-BR"/>
           </a:p>
@@ -3167,7 +3172,7 @@
           <a:p>
             <a:fld id="{75D4078C-6577-4737-A21E-FAD2E33D1047}" type="datetime1">
               <a:rPr lang="pt-BR" smtClean="0"/>
-              <a:t>08/05/2016</a:t>
+              <a:t>14/05/2016</a:t>
             </a:fld>
             <a:endParaRPr lang="pt-BR"/>
           </a:p>
@@ -3503,7 +3508,7 @@
           <a:p>
             <a:fld id="{8CF4199B-0365-4F14-9E01-B67EDF73368F}" type="datetime1">
               <a:rPr lang="pt-BR" smtClean="0"/>
-              <a:t>08/05/2016</a:t>
+              <a:t>14/05/2016</a:t>
             </a:fld>
             <a:endParaRPr lang="pt-BR"/>
           </a:p>
@@ -3758,7 +3763,7 @@
           <a:p>
             <a:fld id="{670DD8E6-7E53-44B3-95E0-3AE339FD1C84}" type="datetime1">
               <a:rPr lang="pt-BR" smtClean="0"/>
-              <a:t>08/05/2016</a:t>
+              <a:t>14/05/2016</a:t>
             </a:fld>
             <a:endParaRPr lang="pt-BR"/>
           </a:p>
@@ -4024,7 +4029,7 @@
           <a:p>
             <a:fld id="{F7A9162F-D208-4302-99BD-ACDE578B5541}" type="datetime1">
               <a:rPr lang="pt-BR" smtClean="0"/>
-              <a:t>08/05/2016</a:t>
+              <a:t>14/05/2016</a:t>
             </a:fld>
             <a:endParaRPr lang="pt-BR"/>
           </a:p>
@@ -4365,7 +4370,7 @@
           <a:p>
             <a:fld id="{0508DFE2-4652-41F3-827F-C9A2BA14195A}" type="datetime1">
               <a:rPr lang="pt-BR" smtClean="0"/>
-              <a:t>08/05/2016</a:t>
+              <a:t>14/05/2016</a:t>
             </a:fld>
             <a:endParaRPr lang="pt-BR"/>
           </a:p>
@@ -4770,7 +4775,7 @@
           <a:p>
             <a:fld id="{0508DFE2-4652-41F3-827F-C9A2BA14195A}" type="datetime1">
               <a:rPr lang="pt-BR" smtClean="0"/>
-              <a:t>08/05/2016</a:t>
+              <a:t>14/05/2016</a:t>
             </a:fld>
             <a:endParaRPr lang="pt-BR"/>
           </a:p>
@@ -5110,7 +5115,7 @@
           <a:p>
             <a:fld id="{0508DFE2-4652-41F3-827F-C9A2BA14195A}" type="datetime1">
               <a:rPr lang="pt-BR" smtClean="0"/>
-              <a:t>08/05/2016</a:t>
+              <a:t>14/05/2016</a:t>
             </a:fld>
             <a:endParaRPr lang="pt-BR"/>
           </a:p>
@@ -5434,7 +5439,7 @@
           <a:p>
             <a:fld id="{0508DFE2-4652-41F3-827F-C9A2BA14195A}" type="datetime1">
               <a:rPr lang="pt-BR" smtClean="0"/>
-              <a:t>08/05/2016</a:t>
+              <a:t>14/05/2016</a:t>
             </a:fld>
             <a:endParaRPr lang="pt-BR"/>
           </a:p>
@@ -5834,7 +5839,7 @@
           <a:p>
             <a:fld id="{0508DFE2-4652-41F3-827F-C9A2BA14195A}" type="datetime1">
               <a:rPr lang="pt-BR" smtClean="0"/>
-              <a:t>08/05/2016</a:t>
+              <a:t>14/05/2016</a:t>
             </a:fld>
             <a:endParaRPr lang="pt-BR"/>
           </a:p>
@@ -6095,7 +6100,7 @@
           <a:p>
             <a:fld id="{87B77DDF-3B70-4799-AC7A-A801FDBC43BE}" type="datetime1">
               <a:rPr lang="pt-BR" smtClean="0"/>
-              <a:t>08/05/2016</a:t>
+              <a:t>14/05/2016</a:t>
             </a:fld>
             <a:endParaRPr lang="pt-BR"/>
           </a:p>
@@ -6360,7 +6365,7 @@
           <a:p>
             <a:fld id="{E726A70C-0FB0-43B5-ABD4-6875AAD5A9ED}" type="datetime1">
               <a:rPr lang="pt-BR" smtClean="0"/>
-              <a:t>08/05/2016</a:t>
+              <a:t>14/05/2016</a:t>
             </a:fld>
             <a:endParaRPr lang="pt-BR"/>
           </a:p>
@@ -6696,7 +6701,7 @@
           <a:p>
             <a:fld id="{F98F91F4-AE67-48E5-B32D-ECBC1B48D03F}" type="datetime1">
               <a:rPr lang="pt-BR" smtClean="0"/>
-              <a:t>08/05/2016</a:t>
+              <a:t>14/05/2016</a:t>
             </a:fld>
             <a:endParaRPr lang="pt-BR"/>
           </a:p>
@@ -6931,7 +6936,7 @@
           <a:p>
             <a:fld id="{7E1EAD6D-1BB6-4B4E-85B9-C00C2E761DDF}" type="datetime1">
               <a:rPr lang="pt-BR" smtClean="0"/>
-              <a:t>08/05/2016</a:t>
+              <a:t>14/05/2016</a:t>
             </a:fld>
             <a:endParaRPr lang="pt-BR"/>
           </a:p>
@@ -7281,7 +7286,7 @@
           <a:p>
             <a:fld id="{0B1731E2-81B3-4417-95DA-8536F39540FB}" type="datetime1">
               <a:rPr lang="pt-BR" smtClean="0"/>
-              <a:t>08/05/2016</a:t>
+              <a:t>14/05/2016</a:t>
             </a:fld>
             <a:endParaRPr lang="pt-BR"/>
           </a:p>
@@ -7402,7 +7407,7 @@
           <a:p>
             <a:fld id="{2CA65B17-9BC9-492D-A3A2-F3989EAF5F85}" type="datetime1">
               <a:rPr lang="pt-BR" smtClean="0"/>
-              <a:t>08/05/2016</a:t>
+              <a:t>14/05/2016</a:t>
             </a:fld>
             <a:endParaRPr lang="pt-BR"/>
           </a:p>
@@ -7523,7 +7528,7 @@
           <a:p>
             <a:fld id="{FE6597BE-2610-4C06-A38B-3FE23213DF28}" type="datetime1">
               <a:rPr lang="pt-BR" smtClean="0"/>
-              <a:t>08/05/2016</a:t>
+              <a:t>14/05/2016</a:t>
             </a:fld>
             <a:endParaRPr lang="pt-BR"/>
           </a:p>
@@ -7810,7 +7815,7 @@
           <a:p>
             <a:fld id="{BA788789-1ACE-4D1B-A2D1-F0A871528844}" type="datetime1">
               <a:rPr lang="pt-BR" smtClean="0"/>
-              <a:t>08/05/2016</a:t>
+              <a:t>14/05/2016</a:t>
             </a:fld>
             <a:endParaRPr lang="pt-BR"/>
           </a:p>
@@ -8077,7 +8082,7 @@
           <a:p>
             <a:fld id="{7A99FA8B-6340-483D-B278-B3203D26162E}" type="datetime1">
               <a:rPr lang="pt-BR" smtClean="0"/>
-              <a:t>08/05/2016</a:t>
+              <a:t>14/05/2016</a:t>
             </a:fld>
             <a:endParaRPr lang="pt-BR"/>
           </a:p>
@@ -8294,7 +8299,7 @@
           <a:p>
             <a:fld id="{0508DFE2-4652-41F3-827F-C9A2BA14195A}" type="datetime1">
               <a:rPr lang="pt-BR" smtClean="0"/>
-              <a:t>08/05/2016</a:t>
+              <a:t>14/05/2016</a:t>
             </a:fld>
             <a:endParaRPr lang="pt-BR"/>
           </a:p>
@@ -10644,7 +10649,7 @@
           <a:p>
             <a:fld id="{0508DFE2-4652-41F3-827F-C9A2BA14195A}" type="datetime1">
               <a:rPr lang="pt-BR" smtClean="0"/>
-              <a:t>08/05/2016</a:t>
+              <a:t>14/05/2016</a:t>
             </a:fld>
             <a:endParaRPr lang="pt-BR"/>
           </a:p>
@@ -11224,6 +11229,622 @@
 </p:sld>
 </file>
 
+<file path=ppt/slides/slide10.xml><?xml version="1.0" encoding="utf-8"?>
+<p:sld xmlns:a="http://schemas.openxmlformats.org/drawingml/2006/main" xmlns:r="http://schemas.openxmlformats.org/officeDocument/2006/relationships" xmlns:p="http://schemas.openxmlformats.org/presentationml/2006/main">
+  <p:cSld>
+    <p:spTree>
+      <p:nvGrpSpPr>
+        <p:cNvPr id="1" name=""/>
+        <p:cNvGrpSpPr/>
+        <p:nvPr/>
+      </p:nvGrpSpPr>
+      <p:grpSpPr>
+        <a:xfrm>
+          <a:off x="0" y="0"/>
+          <a:ext cx="0" cy="0"/>
+          <a:chOff x="0" y="0"/>
+          <a:chExt cx="0" cy="0"/>
+        </a:xfrm>
+      </p:grpSpPr>
+      <p:sp>
+        <p:nvSpPr>
+          <p:cNvPr id="2" name="Título 1"/>
+          <p:cNvSpPr>
+            <a:spLocks noGrp="1"/>
+          </p:cNvSpPr>
+          <p:nvPr>
+            <p:ph type="title"/>
+          </p:nvPr>
+        </p:nvSpPr>
+        <p:spPr/>
+        <p:txBody>
+          <a:bodyPr/>
+          <a:lstStyle/>
+          <a:p>
+            <a:r>
+              <a:rPr lang="pt-BR" b="1" dirty="0"/>
+              <a:t>6.1.2 Planejar o gerenciamento do cronograma: ferramentas e técnicas</a:t>
+            </a:r>
+            <a:endParaRPr lang="pt-BR" dirty="0"/>
+          </a:p>
+        </p:txBody>
+      </p:sp>
+      <p:sp>
+        <p:nvSpPr>
+          <p:cNvPr id="3" name="Espaço Reservado para Conteúdo 2"/>
+          <p:cNvSpPr>
+            <a:spLocks noGrp="1"/>
+          </p:cNvSpPr>
+          <p:nvPr>
+            <p:ph idx="1"/>
+          </p:nvPr>
+        </p:nvSpPr>
+        <p:spPr/>
+        <p:txBody>
+          <a:bodyPr/>
+          <a:lstStyle/>
+          <a:p>
+            <a:r>
+              <a:rPr lang="pt-BR" b="1" dirty="0"/>
+              <a:t>6.1.2.1 Opinião especializada</a:t>
+            </a:r>
+          </a:p>
+          <a:p>
+            <a:r>
+              <a:rPr lang="pt-BR" b="1" dirty="0"/>
+              <a:t>6.1.2.2 Técnicas analíticas</a:t>
+            </a:r>
+          </a:p>
+          <a:p>
+            <a:r>
+              <a:rPr lang="pt-BR" b="1" dirty="0"/>
+              <a:t>6.1.2.3 Reuniões</a:t>
+            </a:r>
+            <a:endParaRPr lang="pt-BR" dirty="0"/>
+          </a:p>
+        </p:txBody>
+      </p:sp>
+      <p:sp>
+        <p:nvSpPr>
+          <p:cNvPr id="4" name="Espaço Reservado para Rodapé 3"/>
+          <p:cNvSpPr>
+            <a:spLocks noGrp="1"/>
+          </p:cNvSpPr>
+          <p:nvPr>
+            <p:ph type="ftr" sz="quarter" idx="11"/>
+          </p:nvPr>
+        </p:nvSpPr>
+        <p:spPr/>
+        <p:txBody>
+          <a:bodyPr/>
+          <a:lstStyle/>
+          <a:p>
+            <a:r>
+              <a:rPr lang="pt-BR"/>
+              <a:t>Gestão de Tempo</a:t>
+            </a:r>
+          </a:p>
+        </p:txBody>
+      </p:sp>
+      <p:sp>
+        <p:nvSpPr>
+          <p:cNvPr id="5" name="Espaço Reservado para Número de Slide 4"/>
+          <p:cNvSpPr>
+            <a:spLocks noGrp="1"/>
+          </p:cNvSpPr>
+          <p:nvPr>
+            <p:ph type="sldNum" sz="quarter" idx="12"/>
+          </p:nvPr>
+        </p:nvSpPr>
+        <p:spPr/>
+        <p:txBody>
+          <a:bodyPr/>
+          <a:lstStyle/>
+          <a:p>
+            <a:fld id="{E00582C5-1892-4DFB-94B5-D9561028E520}" type="slidenum">
+              <a:rPr lang="pt-BR" smtClean="0"/>
+              <a:t>10</a:t>
+            </a:fld>
+            <a:endParaRPr lang="pt-BR"/>
+          </a:p>
+        </p:txBody>
+      </p:sp>
+    </p:spTree>
+    <p:extLst>
+      <p:ext uri="{BB962C8B-B14F-4D97-AF65-F5344CB8AC3E}">
+        <p14:creationId xmlns:p14="http://schemas.microsoft.com/office/powerpoint/2010/main" val="951629819"/>
+      </p:ext>
+    </p:extLst>
+  </p:cSld>
+  <p:clrMapOvr>
+    <a:masterClrMapping/>
+  </p:clrMapOvr>
+</p:sld>
+</file>
+
+<file path=ppt/slides/slide11.xml><?xml version="1.0" encoding="utf-8"?>
+<p:sld xmlns:a="http://schemas.openxmlformats.org/drawingml/2006/main" xmlns:r="http://schemas.openxmlformats.org/officeDocument/2006/relationships" xmlns:p="http://schemas.openxmlformats.org/presentationml/2006/main">
+  <p:cSld>
+    <p:spTree>
+      <p:nvGrpSpPr>
+        <p:cNvPr id="1" name=""/>
+        <p:cNvGrpSpPr/>
+        <p:nvPr/>
+      </p:nvGrpSpPr>
+      <p:grpSpPr>
+        <a:xfrm>
+          <a:off x="0" y="0"/>
+          <a:ext cx="0" cy="0"/>
+          <a:chOff x="0" y="0"/>
+          <a:chExt cx="0" cy="0"/>
+        </a:xfrm>
+      </p:grpSpPr>
+      <p:sp>
+        <p:nvSpPr>
+          <p:cNvPr id="2" name="Título 1"/>
+          <p:cNvSpPr>
+            <a:spLocks noGrp="1"/>
+          </p:cNvSpPr>
+          <p:nvPr>
+            <p:ph type="title"/>
+          </p:nvPr>
+        </p:nvSpPr>
+        <p:spPr/>
+        <p:txBody>
+          <a:bodyPr/>
+          <a:lstStyle/>
+          <a:p>
+            <a:r>
+              <a:rPr lang="pt-BR" b="1" dirty="0"/>
+              <a:t>6.1.3 Planejar o gerenciamento do cronograma: saídas</a:t>
+            </a:r>
+            <a:endParaRPr lang="pt-BR" dirty="0"/>
+          </a:p>
+        </p:txBody>
+      </p:sp>
+      <p:sp>
+        <p:nvSpPr>
+          <p:cNvPr id="3" name="Espaço Reservado para Conteúdo 2"/>
+          <p:cNvSpPr>
+            <a:spLocks noGrp="1"/>
+          </p:cNvSpPr>
+          <p:nvPr>
+            <p:ph idx="1"/>
+          </p:nvPr>
+        </p:nvSpPr>
+        <p:spPr/>
+        <p:txBody>
+          <a:bodyPr/>
+          <a:lstStyle/>
+          <a:p>
+            <a:r>
+              <a:rPr lang="pt-BR" b="1" dirty="0"/>
+              <a:t>6.1.3.1 Plano de gerenciamento do cronograma</a:t>
+            </a:r>
+            <a:endParaRPr lang="pt-BR" dirty="0"/>
+          </a:p>
+        </p:txBody>
+      </p:sp>
+      <p:sp>
+        <p:nvSpPr>
+          <p:cNvPr id="4" name="Espaço Reservado para Rodapé 3"/>
+          <p:cNvSpPr>
+            <a:spLocks noGrp="1"/>
+          </p:cNvSpPr>
+          <p:nvPr>
+            <p:ph type="ftr" sz="quarter" idx="11"/>
+          </p:nvPr>
+        </p:nvSpPr>
+        <p:spPr/>
+        <p:txBody>
+          <a:bodyPr/>
+          <a:lstStyle/>
+          <a:p>
+            <a:r>
+              <a:rPr lang="pt-BR"/>
+              <a:t>Gestão de Tempo</a:t>
+            </a:r>
+          </a:p>
+        </p:txBody>
+      </p:sp>
+      <p:sp>
+        <p:nvSpPr>
+          <p:cNvPr id="5" name="Espaço Reservado para Número de Slide 4"/>
+          <p:cNvSpPr>
+            <a:spLocks noGrp="1"/>
+          </p:cNvSpPr>
+          <p:nvPr>
+            <p:ph type="sldNum" sz="quarter" idx="12"/>
+          </p:nvPr>
+        </p:nvSpPr>
+        <p:spPr/>
+        <p:txBody>
+          <a:bodyPr/>
+          <a:lstStyle/>
+          <a:p>
+            <a:fld id="{E00582C5-1892-4DFB-94B5-D9561028E520}" type="slidenum">
+              <a:rPr lang="pt-BR" smtClean="0"/>
+              <a:t>11</a:t>
+            </a:fld>
+            <a:endParaRPr lang="pt-BR"/>
+          </a:p>
+        </p:txBody>
+      </p:sp>
+    </p:spTree>
+    <p:extLst>
+      <p:ext uri="{BB962C8B-B14F-4D97-AF65-F5344CB8AC3E}">
+        <p14:creationId xmlns:p14="http://schemas.microsoft.com/office/powerpoint/2010/main" val="3952023312"/>
+      </p:ext>
+    </p:extLst>
+  </p:cSld>
+  <p:clrMapOvr>
+    <a:masterClrMapping/>
+  </p:clrMapOvr>
+</p:sld>
+</file>
+
+<file path=ppt/slides/slide12.xml><?xml version="1.0" encoding="utf-8"?>
+<p:sld xmlns:a="http://schemas.openxmlformats.org/drawingml/2006/main" xmlns:r="http://schemas.openxmlformats.org/officeDocument/2006/relationships" xmlns:p="http://schemas.openxmlformats.org/presentationml/2006/main">
+  <p:cSld>
+    <p:spTree>
+      <p:nvGrpSpPr>
+        <p:cNvPr id="1" name=""/>
+        <p:cNvGrpSpPr/>
+        <p:nvPr/>
+      </p:nvGrpSpPr>
+      <p:grpSpPr>
+        <a:xfrm>
+          <a:off x="0" y="0"/>
+          <a:ext cx="0" cy="0"/>
+          <a:chOff x="0" y="0"/>
+          <a:chExt cx="0" cy="0"/>
+        </a:xfrm>
+      </p:grpSpPr>
+      <p:sp>
+        <p:nvSpPr>
+          <p:cNvPr id="2" name="Título 1"/>
+          <p:cNvSpPr>
+            <a:spLocks noGrp="1"/>
+          </p:cNvSpPr>
+          <p:nvPr>
+            <p:ph type="title"/>
+          </p:nvPr>
+        </p:nvSpPr>
+        <p:spPr/>
+        <p:txBody>
+          <a:bodyPr/>
+          <a:lstStyle/>
+          <a:p>
+            <a:r>
+              <a:rPr lang="pt-BR" dirty="0"/>
+              <a:t>Elton – Desenvolvimento.</a:t>
+            </a:r>
+          </a:p>
+        </p:txBody>
+      </p:sp>
+      <p:sp>
+        <p:nvSpPr>
+          <p:cNvPr id="3" name="Espaço Reservado para Conteúdo 2"/>
+          <p:cNvSpPr>
+            <a:spLocks noGrp="1"/>
+          </p:cNvSpPr>
+          <p:nvPr>
+            <p:ph idx="1"/>
+          </p:nvPr>
+        </p:nvSpPr>
+        <p:spPr/>
+        <p:txBody>
+          <a:bodyPr/>
+          <a:lstStyle/>
+          <a:p>
+            <a:endParaRPr lang="pt-BR"/>
+          </a:p>
+        </p:txBody>
+      </p:sp>
+      <p:sp>
+        <p:nvSpPr>
+          <p:cNvPr id="4" name="Espaço Reservado para Rodapé 3"/>
+          <p:cNvSpPr>
+            <a:spLocks noGrp="1"/>
+          </p:cNvSpPr>
+          <p:nvPr>
+            <p:ph type="ftr" sz="quarter" idx="11"/>
+          </p:nvPr>
+        </p:nvSpPr>
+        <p:spPr/>
+        <p:txBody>
+          <a:bodyPr/>
+          <a:lstStyle/>
+          <a:p>
+            <a:r>
+              <a:rPr lang="pt-BR"/>
+              <a:t>Gestão de Tempo</a:t>
+            </a:r>
+          </a:p>
+        </p:txBody>
+      </p:sp>
+      <p:sp>
+        <p:nvSpPr>
+          <p:cNvPr id="5" name="Espaço Reservado para Número de Slide 4"/>
+          <p:cNvSpPr>
+            <a:spLocks noGrp="1"/>
+          </p:cNvSpPr>
+          <p:nvPr>
+            <p:ph type="sldNum" sz="quarter" idx="12"/>
+          </p:nvPr>
+        </p:nvSpPr>
+        <p:spPr/>
+        <p:txBody>
+          <a:bodyPr/>
+          <a:lstStyle/>
+          <a:p>
+            <a:fld id="{E00582C5-1892-4DFB-94B5-D9561028E520}" type="slidenum">
+              <a:rPr lang="pt-BR" smtClean="0"/>
+              <a:t>12</a:t>
+            </a:fld>
+            <a:endParaRPr lang="pt-BR"/>
+          </a:p>
+        </p:txBody>
+      </p:sp>
+    </p:spTree>
+    <p:extLst>
+      <p:ext uri="{BB962C8B-B14F-4D97-AF65-F5344CB8AC3E}">
+        <p14:creationId xmlns:p14="http://schemas.microsoft.com/office/powerpoint/2010/main" val="3475372586"/>
+      </p:ext>
+    </p:extLst>
+  </p:cSld>
+  <p:clrMapOvr>
+    <a:masterClrMapping/>
+  </p:clrMapOvr>
+</p:sld>
+</file>
+
+<file path=ppt/slides/slide13.xml><?xml version="1.0" encoding="utf-8"?>
+<p:sld xmlns:a="http://schemas.openxmlformats.org/drawingml/2006/main" xmlns:r="http://schemas.openxmlformats.org/officeDocument/2006/relationships" xmlns:p="http://schemas.openxmlformats.org/presentationml/2006/main">
+  <p:cSld>
+    <p:spTree>
+      <p:nvGrpSpPr>
+        <p:cNvPr id="1" name=""/>
+        <p:cNvGrpSpPr/>
+        <p:nvPr/>
+      </p:nvGrpSpPr>
+      <p:grpSpPr>
+        <a:xfrm>
+          <a:off x="0" y="0"/>
+          <a:ext cx="0" cy="0"/>
+          <a:chOff x="0" y="0"/>
+          <a:chExt cx="0" cy="0"/>
+        </a:xfrm>
+      </p:grpSpPr>
+      <p:sp>
+        <p:nvSpPr>
+          <p:cNvPr id="2" name="Título 1"/>
+          <p:cNvSpPr>
+            <a:spLocks noGrp="1"/>
+          </p:cNvSpPr>
+          <p:nvPr>
+            <p:ph type="title"/>
+          </p:nvPr>
+        </p:nvSpPr>
+        <p:spPr/>
+        <p:txBody>
+          <a:bodyPr>
+            <a:normAutofit/>
+          </a:bodyPr>
+          <a:lstStyle/>
+          <a:p>
+            <a:r>
+              <a:rPr lang="pt-BR" dirty="0"/>
+              <a:t>Rodrigo – Desenvolvimento e conclusão.</a:t>
+            </a:r>
+          </a:p>
+        </p:txBody>
+      </p:sp>
+      <p:sp>
+        <p:nvSpPr>
+          <p:cNvPr id="3" name="Espaço Reservado para Conteúdo 2"/>
+          <p:cNvSpPr>
+            <a:spLocks noGrp="1"/>
+          </p:cNvSpPr>
+          <p:nvPr>
+            <p:ph idx="1"/>
+          </p:nvPr>
+        </p:nvSpPr>
+        <p:spPr/>
+        <p:txBody>
+          <a:bodyPr/>
+          <a:lstStyle/>
+          <a:p>
+            <a:endParaRPr lang="pt-BR" dirty="0"/>
+          </a:p>
+        </p:txBody>
+      </p:sp>
+      <p:sp>
+        <p:nvSpPr>
+          <p:cNvPr id="4" name="Espaço Reservado para Rodapé 3"/>
+          <p:cNvSpPr>
+            <a:spLocks noGrp="1"/>
+          </p:cNvSpPr>
+          <p:nvPr>
+            <p:ph type="ftr" sz="quarter" idx="11"/>
+          </p:nvPr>
+        </p:nvSpPr>
+        <p:spPr/>
+        <p:txBody>
+          <a:bodyPr/>
+          <a:lstStyle/>
+          <a:p>
+            <a:r>
+              <a:rPr lang="pt-BR"/>
+              <a:t>Gestão de Tempo</a:t>
+            </a:r>
+          </a:p>
+        </p:txBody>
+      </p:sp>
+      <p:sp>
+        <p:nvSpPr>
+          <p:cNvPr id="5" name="Espaço Reservado para Número de Slide 4"/>
+          <p:cNvSpPr>
+            <a:spLocks noGrp="1"/>
+          </p:cNvSpPr>
+          <p:nvPr>
+            <p:ph type="sldNum" sz="quarter" idx="12"/>
+          </p:nvPr>
+        </p:nvSpPr>
+        <p:spPr/>
+        <p:txBody>
+          <a:bodyPr/>
+          <a:lstStyle/>
+          <a:p>
+            <a:fld id="{E00582C5-1892-4DFB-94B5-D9561028E520}" type="slidenum">
+              <a:rPr lang="pt-BR" smtClean="0"/>
+              <a:t>13</a:t>
+            </a:fld>
+            <a:endParaRPr lang="pt-BR"/>
+          </a:p>
+        </p:txBody>
+      </p:sp>
+    </p:spTree>
+    <p:extLst>
+      <p:ext uri="{BB962C8B-B14F-4D97-AF65-F5344CB8AC3E}">
+        <p14:creationId xmlns:p14="http://schemas.microsoft.com/office/powerpoint/2010/main" val="3935678412"/>
+      </p:ext>
+    </p:extLst>
+  </p:cSld>
+  <p:clrMapOvr>
+    <a:masterClrMapping/>
+  </p:clrMapOvr>
+</p:sld>
+</file>
+
+<file path=ppt/slides/slide14.xml><?xml version="1.0" encoding="utf-8"?>
+<p:sld xmlns:a="http://schemas.openxmlformats.org/drawingml/2006/main" xmlns:r="http://schemas.openxmlformats.org/officeDocument/2006/relationships" xmlns:p="http://schemas.openxmlformats.org/presentationml/2006/main">
+  <p:cSld>
+    <p:spTree>
+      <p:nvGrpSpPr>
+        <p:cNvPr id="1" name=""/>
+        <p:cNvGrpSpPr/>
+        <p:nvPr/>
+      </p:nvGrpSpPr>
+      <p:grpSpPr>
+        <a:xfrm>
+          <a:off x="0" y="0"/>
+          <a:ext cx="0" cy="0"/>
+          <a:chOff x="0" y="0"/>
+          <a:chExt cx="0" cy="0"/>
+        </a:xfrm>
+      </p:grpSpPr>
+      <p:sp>
+        <p:nvSpPr>
+          <p:cNvPr id="2" name="Título 1"/>
+          <p:cNvSpPr>
+            <a:spLocks noGrp="1"/>
+          </p:cNvSpPr>
+          <p:nvPr>
+            <p:ph type="title"/>
+          </p:nvPr>
+        </p:nvSpPr>
+        <p:spPr/>
+        <p:txBody>
+          <a:bodyPr/>
+          <a:lstStyle/>
+          <a:p>
+            <a:r>
+              <a:rPr lang="pt-BR" dirty="0"/>
+              <a:t>Bibliografia.</a:t>
+            </a:r>
+          </a:p>
+        </p:txBody>
+      </p:sp>
+      <p:sp>
+        <p:nvSpPr>
+          <p:cNvPr id="3" name="Espaço Reservado para Conteúdo 2"/>
+          <p:cNvSpPr>
+            <a:spLocks noGrp="1"/>
+          </p:cNvSpPr>
+          <p:nvPr>
+            <p:ph idx="1"/>
+          </p:nvPr>
+        </p:nvSpPr>
+        <p:spPr/>
+        <p:txBody>
+          <a:bodyPr/>
+          <a:lstStyle/>
+          <a:p>
+            <a:r>
+              <a:rPr lang="pt-BR" dirty="0">
+                <a:hlinkClick r:id="rId2"/>
+              </a:rPr>
+              <a:t>http://michaelis.uol.com.br/moderno/portugues/index.php?lingua=portugues-portugues&amp;palavra=prazo</a:t>
+            </a:r>
+            <a:endParaRPr lang="pt-BR" dirty="0"/>
+          </a:p>
+          <a:p>
+            <a:r>
+              <a:rPr lang="pt-BR" dirty="0"/>
+              <a:t>http://www.diegomacedo.com.br/gerenciamento-do-tempo-do-projeto-pmbok-5a-ed/</a:t>
+            </a:r>
+          </a:p>
+        </p:txBody>
+      </p:sp>
+      <p:sp>
+        <p:nvSpPr>
+          <p:cNvPr id="4" name="Espaço Reservado para Rodapé 3"/>
+          <p:cNvSpPr>
+            <a:spLocks noGrp="1"/>
+          </p:cNvSpPr>
+          <p:nvPr>
+            <p:ph type="ftr" sz="quarter" idx="11"/>
+          </p:nvPr>
+        </p:nvSpPr>
+        <p:spPr/>
+        <p:txBody>
+          <a:bodyPr/>
+          <a:lstStyle/>
+          <a:p>
+            <a:r>
+              <a:rPr lang="pt-BR"/>
+              <a:t>Gestão de Tempo</a:t>
+            </a:r>
+          </a:p>
+        </p:txBody>
+      </p:sp>
+      <p:sp>
+        <p:nvSpPr>
+          <p:cNvPr id="5" name="Espaço Reservado para Número de Slide 4"/>
+          <p:cNvSpPr>
+            <a:spLocks noGrp="1"/>
+          </p:cNvSpPr>
+          <p:nvPr>
+            <p:ph type="sldNum" sz="quarter" idx="12"/>
+          </p:nvPr>
+        </p:nvSpPr>
+        <p:spPr/>
+        <p:txBody>
+          <a:bodyPr/>
+          <a:lstStyle/>
+          <a:p>
+            <a:fld id="{E00582C5-1892-4DFB-94B5-D9561028E520}" type="slidenum">
+              <a:rPr lang="pt-BR" smtClean="0"/>
+              <a:t>14</a:t>
+            </a:fld>
+            <a:endParaRPr lang="pt-BR"/>
+          </a:p>
+        </p:txBody>
+      </p:sp>
+    </p:spTree>
+    <p:extLst>
+      <p:ext uri="{BB962C8B-B14F-4D97-AF65-F5344CB8AC3E}">
+        <p14:creationId xmlns:p14="http://schemas.microsoft.com/office/powerpoint/2010/main" val="1802399433"/>
+      </p:ext>
+    </p:extLst>
+  </p:cSld>
+  <p:clrMapOvr>
+    <a:masterClrMapping/>
+  </p:clrMapOvr>
+</p:sld>
+</file>
+
 <file path=ppt/slides/slide2.xml><?xml version="1.0" encoding="utf-8"?>
 <p:sld xmlns:a="http://schemas.openxmlformats.org/drawingml/2006/main" xmlns:r="http://schemas.openxmlformats.org/officeDocument/2006/relationships" xmlns:p="http://schemas.openxmlformats.org/presentationml/2006/main">
   <p:cSld>
@@ -11375,8 +11996,12 @@
           <a:lstStyle/>
           <a:p>
             <a:r>
+              <a:rPr lang="pt-BR" dirty="0" err="1"/>
+              <a:t>Conceio</a:t>
+            </a:r>
+            <a:r>
               <a:rPr lang="pt-BR" dirty="0"/>
-              <a:t>Definição de prazo</a:t>
+              <a:t> de Tempo e Definição de prazo</a:t>
             </a:r>
           </a:p>
         </p:txBody>
@@ -11397,6 +12022,21 @@
             <a:normAutofit/>
           </a:bodyPr>
           <a:lstStyle/>
+          <a:p>
+            <a:r>
+              <a:rPr lang="pt-BR" dirty="0"/>
+              <a:t>Com base na percepção humana, a concepção comum de </a:t>
+            </a:r>
+            <a:r>
+              <a:rPr lang="pt-BR" b="1" dirty="0"/>
+              <a:t>tempo</a:t>
+            </a:r>
+            <a:r>
+              <a:rPr lang="pt-BR" dirty="0"/>
+              <a:t> é indicada por intervalos ou períodos de duração.</a:t>
+            </a:r>
+            <a:endParaRPr lang="pt-BR" b="1" dirty="0"/>
+          </a:p>
           <a:p>
             <a:r>
               <a:rPr lang="pt-BR" b="1" dirty="0"/>
@@ -11668,7 +12308,10 @@
           <a:bodyPr/>
           <a:lstStyle/>
           <a:p>
-            <a:endParaRPr lang="pt-BR" dirty="0"/>
+            <a:r>
+              <a:rPr lang="pt-BR" dirty="0"/>
+              <a:t>Os Processos</a:t>
+            </a:r>
           </a:p>
         </p:txBody>
       </p:sp>
@@ -11829,7 +12472,10 @@
           <a:bodyPr/>
           <a:lstStyle/>
           <a:p>
-            <a:endParaRPr lang="pt-BR"/>
+            <a:r>
+              <a:rPr lang="pt-BR" dirty="0"/>
+              <a:t>Os Processos</a:t>
+            </a:r>
           </a:p>
         </p:txBody>
       </p:sp>
@@ -11973,30 +12619,40 @@
           <a:p>
             <a:r>
               <a:rPr lang="pt-BR" dirty="0"/>
-              <a:t>Elton – Desenvolvimento.</a:t>
-            </a:r>
-          </a:p>
-        </p:txBody>
-      </p:sp>
-      <p:sp>
-        <p:nvSpPr>
-          <p:cNvPr id="3" name="Espaço Reservado para Conteúdo 2"/>
-          <p:cNvSpPr>
-            <a:spLocks noGrp="1"/>
-          </p:cNvSpPr>
+              <a:t>Os Processos e as Fases</a:t>
+            </a:r>
+          </a:p>
+        </p:txBody>
+      </p:sp>
+      <p:pic>
+        <p:nvPicPr>
+          <p:cNvPr id="6" name="Espaço Reservado para Conteúdo 5"/>
+          <p:cNvPicPr>
+            <a:picLocks noGrp="1" noChangeAspect="1"/>
+          </p:cNvPicPr>
           <p:nvPr>
             <p:ph idx="1"/>
           </p:nvPr>
-        </p:nvSpPr>
-        <p:spPr/>
-        <p:txBody>
-          <a:bodyPr/>
-          <a:lstStyle/>
-          <a:p>
-            <a:endParaRPr lang="pt-BR"/>
-          </a:p>
-        </p:txBody>
-      </p:sp>
+        </p:nvPicPr>
+        <p:blipFill>
+          <a:blip r:embed="rId2">
+            <a:extLst>
+              <a:ext uri="{28A0092B-C50C-407E-A947-70E740481C1C}">
+                <a14:useLocalDpi xmlns:a14="http://schemas.microsoft.com/office/drawing/2010/main" val="0"/>
+              </a:ext>
+            </a:extLst>
+          </a:blip>
+          <a:stretch>
+            <a:fillRect/>
+          </a:stretch>
+        </p:blipFill>
+        <p:spPr>
+          <a:xfrm>
+            <a:off x="2288807" y="1677255"/>
+            <a:ext cx="8220808" cy="4458553"/>
+          </a:xfrm>
+        </p:spPr>
+      </p:pic>
       <p:sp>
         <p:nvSpPr>
           <p:cNvPr id="4" name="Espaço Reservado para Rodapé 3"/>
@@ -12045,7 +12701,7 @@
     </p:spTree>
     <p:extLst>
       <p:ext uri="{BB962C8B-B14F-4D97-AF65-F5344CB8AC3E}">
-        <p14:creationId xmlns:p14="http://schemas.microsoft.com/office/powerpoint/2010/main" val="3475372586"/>
+        <p14:creationId xmlns:p14="http://schemas.microsoft.com/office/powerpoint/2010/main" val="2320947915"/>
       </p:ext>
     </p:extLst>
   </p:cSld>
@@ -12091,7 +12747,7 @@
           <a:p>
             <a:r>
               <a:rPr lang="pt-BR" dirty="0"/>
-              <a:t>Rodrigo – Desenvolvimento e conclusão.</a:t>
+              <a:t>6.1 Planejar o gerenciamento do cronograma</a:t>
             </a:r>
           </a:p>
         </p:txBody>
@@ -12108,9 +12764,95 @@
         </p:nvSpPr>
         <p:spPr/>
         <p:txBody>
-          <a:bodyPr/>
-          <a:lstStyle/>
-          <a:p>
+          <a:bodyPr>
+            <a:normAutofit fontScale="85000" lnSpcReduction="10000"/>
+          </a:bodyPr>
+          <a:lstStyle/>
+          <a:p>
+            <a:r>
+              <a:rPr lang="pt-BR" dirty="0"/>
+              <a:t>É o processo de estabelecer as políticas, os procedimentos e a documentação para planejamento, desenvolvimento, gerenciamento, execução e controle do cronograma do projeto. </a:t>
+            </a:r>
+          </a:p>
+          <a:p>
+            <a:r>
+              <a:rPr lang="pt-BR" dirty="0"/>
+              <a:t>Entradas </a:t>
+            </a:r>
+            <a:br>
+              <a:rPr lang="pt-BR" dirty="0"/>
+            </a:br>
+            <a:r>
+              <a:rPr lang="pt-BR" dirty="0"/>
+              <a:t>	Plano de Gerenciamento do Projeto </a:t>
+            </a:r>
+            <a:br>
+              <a:rPr lang="pt-BR" dirty="0"/>
+            </a:br>
+            <a:r>
+              <a:rPr lang="pt-BR" dirty="0"/>
+              <a:t>	Termo de abertura do projeto </a:t>
+            </a:r>
+            <a:br>
+              <a:rPr lang="pt-BR" dirty="0"/>
+            </a:br>
+            <a:r>
+              <a:rPr lang="pt-BR" dirty="0"/>
+              <a:t>	Fatores ambientais da empresa </a:t>
+            </a:r>
+            <a:br>
+              <a:rPr lang="pt-BR" dirty="0"/>
+            </a:br>
+            <a:r>
+              <a:rPr lang="pt-BR" dirty="0"/>
+              <a:t>	Ativos de processos organizacionais </a:t>
+            </a:r>
+          </a:p>
+          <a:p>
+            <a:r>
+              <a:rPr lang="pt-BR" dirty="0"/>
+              <a:t>Ferramentas &amp; Técnicas </a:t>
+            </a:r>
+            <a:br>
+              <a:rPr lang="pt-BR" dirty="0"/>
+            </a:br>
+            <a:r>
+              <a:rPr lang="pt-BR" dirty="0"/>
+              <a:t>	Opinião especializada </a:t>
+            </a:r>
+            <a:br>
+              <a:rPr lang="pt-BR" dirty="0"/>
+            </a:br>
+            <a:r>
+              <a:rPr lang="pt-BR" dirty="0"/>
+              <a:t>	Técnicas analíticas </a:t>
+            </a:r>
+            <a:br>
+              <a:rPr lang="pt-BR" dirty="0"/>
+            </a:br>
+            <a:r>
+              <a:rPr lang="pt-BR" dirty="0"/>
+              <a:t>	Reuniões </a:t>
+            </a:r>
+          </a:p>
+          <a:p>
+            <a:r>
+              <a:rPr lang="pt-BR" dirty="0"/>
+              <a:t>Saídas </a:t>
+            </a:r>
+            <a:br>
+              <a:rPr lang="pt-BR" dirty="0"/>
+            </a:br>
+            <a:r>
+              <a:rPr lang="pt-BR" dirty="0"/>
+              <a:t>	Plano de gerenciamento do cronograma</a:t>
+            </a:r>
+            <a:br>
+              <a:rPr lang="pt-BR" dirty="0"/>
+            </a:br>
+            <a:br>
+              <a:rPr lang="pt-BR" dirty="0"/>
+            </a:br>
             <a:endParaRPr lang="pt-BR" dirty="0"/>
           </a:p>
         </p:txBody>
@@ -12163,7 +12905,7 @@
     </p:spTree>
     <p:extLst>
       <p:ext uri="{BB962C8B-B14F-4D97-AF65-F5344CB8AC3E}">
-        <p14:creationId xmlns:p14="http://schemas.microsoft.com/office/powerpoint/2010/main" val="3935678412"/>
+        <p14:creationId xmlns:p14="http://schemas.microsoft.com/office/powerpoint/2010/main" val="3492919033"/>
       </p:ext>
     </p:extLst>
   </p:cSld>
@@ -12206,39 +12948,101 @@
           <a:lstStyle/>
           <a:p>
             <a:r>
+              <a:rPr lang="pt-BR" b="1" dirty="0"/>
+              <a:t>6.1.1 Planejar o gerenciamento do cronograma: entradas</a:t>
+            </a:r>
+            <a:endParaRPr lang="pt-BR" dirty="0"/>
+          </a:p>
+        </p:txBody>
+      </p:sp>
+      <p:sp>
+        <p:nvSpPr>
+          <p:cNvPr id="3" name="Espaço Reservado para Conteúdo 2"/>
+          <p:cNvSpPr>
+            <a:spLocks noGrp="1"/>
+          </p:cNvSpPr>
+          <p:nvPr>
+            <p:ph idx="1"/>
+          </p:nvPr>
+        </p:nvSpPr>
+        <p:spPr/>
+        <p:txBody>
+          <a:bodyPr>
+            <a:normAutofit fontScale="70000" lnSpcReduction="20000"/>
+          </a:bodyPr>
+          <a:lstStyle/>
+          <a:p>
+            <a:r>
+              <a:rPr lang="pt-BR" b="1" dirty="0"/>
+              <a:t>6.1.1.1 Plano de gerenciamento do projeto</a:t>
+            </a:r>
+          </a:p>
+          <a:p>
+            <a:pPr lvl="1"/>
+            <a:r>
               <a:rPr lang="pt-BR" dirty="0"/>
-              <a:t>Bibliografia.</a:t>
-            </a:r>
-          </a:p>
-        </p:txBody>
-      </p:sp>
-      <p:sp>
-        <p:nvSpPr>
-          <p:cNvPr id="3" name="Espaço Reservado para Conteúdo 2"/>
-          <p:cNvSpPr>
-            <a:spLocks noGrp="1"/>
-          </p:cNvSpPr>
-          <p:nvPr>
-            <p:ph idx="1"/>
-          </p:nvPr>
-        </p:nvSpPr>
-        <p:spPr/>
-        <p:txBody>
-          <a:bodyPr/>
-          <a:lstStyle/>
-          <a:p>
-            <a:r>
-              <a:rPr lang="pt-BR" dirty="0">
-                <a:hlinkClick r:id="rId2"/>
-              </a:rPr>
-              <a:t>http://michaelis.uol.com.br/moderno/portugues/index.php?lingua=portugues-portugues&amp;palavra=prazo</a:t>
-            </a:r>
-            <a:endParaRPr lang="pt-BR" dirty="0"/>
-          </a:p>
-          <a:p>
+              <a:t>Contém informações usadas para desenvolver o plano de gerenciamento do cronograma que incluem, mas não estão limitadas a:</a:t>
+            </a:r>
+          </a:p>
+          <a:p>
+            <a:pPr lvl="1"/>
             <a:r>
               <a:rPr lang="pt-BR" dirty="0"/>
-              <a:t>http://www.diegomacedo.com.br/gerenciamento-do-tempo-do-projeto-pmbok-5a-ed/</a:t>
+              <a:t>Linha de base do escopo(Especificação do escopo do projeto e detalhes da estrutura analítica do projeto(EAP)) e a outras informações.</a:t>
+            </a:r>
+          </a:p>
+          <a:p>
+            <a:r>
+              <a:rPr lang="pt-BR" b="1" dirty="0"/>
+              <a:t>6.1.1.2 Termo de abertura do projeto</a:t>
+            </a:r>
+          </a:p>
+          <a:p>
+            <a:pPr lvl="1"/>
+            <a:r>
+              <a:rPr lang="pt-BR" dirty="0"/>
+              <a:t>Apesenta o resumo do cronograma de marcos e os requisitos de aprovação do projeto que influenciarão o gerenciamento do cronograma do projeto.</a:t>
+            </a:r>
+            <a:endParaRPr lang="pt-BR" b="1" dirty="0"/>
+          </a:p>
+          <a:p>
+            <a:r>
+              <a:rPr lang="pt-BR" b="1" dirty="0"/>
+              <a:t>6.1.1.3 Fatores ambientais da empresa</a:t>
+            </a:r>
+          </a:p>
+          <a:p>
+            <a:pPr lvl="1"/>
+            <a:r>
+              <a:rPr lang="pt-BR" dirty="0"/>
+              <a:t>Influenciam o processo Planejar o gerenciamento do cronograma incluem, mas não estão limitados, a:</a:t>
+            </a:r>
+          </a:p>
+          <a:p>
+            <a:pPr lvl="1"/>
+            <a:r>
+              <a:rPr lang="pt-BR" dirty="0"/>
+              <a:t>Estrutura e cultura, disponibilidade de recursos e habilidades, informações comerciais publicadas e Sistemas organizacionais de autorização do trabalho.</a:t>
+            </a:r>
+          </a:p>
+          <a:p>
+            <a:r>
+              <a:rPr lang="pt-BR" b="1" dirty="0"/>
+              <a:t>6.1.1.4 Ativos de processos organizacionais</a:t>
+            </a:r>
+          </a:p>
+          <a:p>
+            <a:pPr lvl="1"/>
+            <a:r>
+              <a:rPr lang="pt-BR" dirty="0"/>
+              <a:t>Influenciam o processo Planejar o gerenciamento do cronograma incluem, mas não estão limitados, a:</a:t>
+            </a:r>
+          </a:p>
+          <a:p>
+            <a:pPr lvl="1"/>
+            <a:r>
+              <a:rPr lang="pt-BR" dirty="0"/>
+              <a:t>Ferramentas de monitoramento, informações históricas, ferramentas de controle do cronograma, modelos, diretrizes para o encerramento do projeto, procedimento de controle das mudanças e riscos.</a:t>
             </a:r>
           </a:p>
         </p:txBody>
@@ -12291,7 +13095,7 @@
     </p:spTree>
     <p:extLst>
       <p:ext uri="{BB962C8B-B14F-4D97-AF65-F5344CB8AC3E}">
-        <p14:creationId xmlns:p14="http://schemas.microsoft.com/office/powerpoint/2010/main" val="1802399433"/>
+        <p14:creationId xmlns:p14="http://schemas.microsoft.com/office/powerpoint/2010/main" val="436033815"/>
       </p:ext>
     </p:extLst>
   </p:cSld>

</xml_diff>